<commit_message>
Small refactoring for better readability
</commit_message>
<xml_diff>
--- a/algorithms/voting_mechanisms/play_data.pptx
+++ b/algorithms/voting_mechanisms/play_data.pptx
@@ -5,8 +5,9 @@
     <p:sldMasterId id="2147483648" r:id="rId1"/>
   </p:sldMasterIdLst>
   <p:sldIdLst>
-    <p:sldId id="256" r:id="rId2"/>
-    <p:sldId id="257" r:id="rId3"/>
+    <p:sldId id="258" r:id="rId2"/>
+    <p:sldId id="259" r:id="rId3"/>
+    <p:sldId id="257" r:id="rId4"/>
   </p:sldIdLst>
   <p:sldSz cx="12192000" cy="6858000"/>
   <p:notesSz cx="6858000" cy="9144000"/>
@@ -244,7 +245,7 @@
           <a:p>
             <a:fld id="{BD94D9DB-14C8-4E19-B200-9FFE58F04E4D}" type="datetimeFigureOut">
               <a:rPr lang="de-DE" smtClean="0"/>
-              <a:t>23.10.2020</a:t>
+              <a:t>24.06.2021</a:t>
             </a:fld>
             <a:endParaRPr lang="de-DE"/>
           </a:p>
@@ -414,7 +415,7 @@
           <a:p>
             <a:fld id="{BD94D9DB-14C8-4E19-B200-9FFE58F04E4D}" type="datetimeFigureOut">
               <a:rPr lang="de-DE" smtClean="0"/>
-              <a:t>23.10.2020</a:t>
+              <a:t>24.06.2021</a:t>
             </a:fld>
             <a:endParaRPr lang="de-DE"/>
           </a:p>
@@ -594,7 +595,7 @@
           <a:p>
             <a:fld id="{BD94D9DB-14C8-4E19-B200-9FFE58F04E4D}" type="datetimeFigureOut">
               <a:rPr lang="de-DE" smtClean="0"/>
-              <a:t>23.10.2020</a:t>
+              <a:t>24.06.2021</a:t>
             </a:fld>
             <a:endParaRPr lang="de-DE"/>
           </a:p>
@@ -764,7 +765,7 @@
           <a:p>
             <a:fld id="{BD94D9DB-14C8-4E19-B200-9FFE58F04E4D}" type="datetimeFigureOut">
               <a:rPr lang="de-DE" smtClean="0"/>
-              <a:t>23.10.2020</a:t>
+              <a:t>24.06.2021</a:t>
             </a:fld>
             <a:endParaRPr lang="de-DE"/>
           </a:p>
@@ -1010,7 +1011,7 @@
           <a:p>
             <a:fld id="{BD94D9DB-14C8-4E19-B200-9FFE58F04E4D}" type="datetimeFigureOut">
               <a:rPr lang="de-DE" smtClean="0"/>
-              <a:t>23.10.2020</a:t>
+              <a:t>24.06.2021</a:t>
             </a:fld>
             <a:endParaRPr lang="de-DE"/>
           </a:p>
@@ -1242,7 +1243,7 @@
           <a:p>
             <a:fld id="{BD94D9DB-14C8-4E19-B200-9FFE58F04E4D}" type="datetimeFigureOut">
               <a:rPr lang="de-DE" smtClean="0"/>
-              <a:t>23.10.2020</a:t>
+              <a:t>24.06.2021</a:t>
             </a:fld>
             <a:endParaRPr lang="de-DE"/>
           </a:p>
@@ -1609,7 +1610,7 @@
           <a:p>
             <a:fld id="{BD94D9DB-14C8-4E19-B200-9FFE58F04E4D}" type="datetimeFigureOut">
               <a:rPr lang="de-DE" smtClean="0"/>
-              <a:t>23.10.2020</a:t>
+              <a:t>24.06.2021</a:t>
             </a:fld>
             <a:endParaRPr lang="de-DE"/>
           </a:p>
@@ -1727,7 +1728,7 @@
           <a:p>
             <a:fld id="{BD94D9DB-14C8-4E19-B200-9FFE58F04E4D}" type="datetimeFigureOut">
               <a:rPr lang="de-DE" smtClean="0"/>
-              <a:t>23.10.2020</a:t>
+              <a:t>24.06.2021</a:t>
             </a:fld>
             <a:endParaRPr lang="de-DE"/>
           </a:p>
@@ -1822,7 +1823,7 @@
           <a:p>
             <a:fld id="{BD94D9DB-14C8-4E19-B200-9FFE58F04E4D}" type="datetimeFigureOut">
               <a:rPr lang="de-DE" smtClean="0"/>
-              <a:t>23.10.2020</a:t>
+              <a:t>24.06.2021</a:t>
             </a:fld>
             <a:endParaRPr lang="de-DE"/>
           </a:p>
@@ -2099,7 +2100,7 @@
           <a:p>
             <a:fld id="{BD94D9DB-14C8-4E19-B200-9FFE58F04E4D}" type="datetimeFigureOut">
               <a:rPr lang="de-DE" smtClean="0"/>
-              <a:t>23.10.2020</a:t>
+              <a:t>24.06.2021</a:t>
             </a:fld>
             <a:endParaRPr lang="de-DE"/>
           </a:p>
@@ -2352,7 +2353,7 @@
           <a:p>
             <a:fld id="{BD94D9DB-14C8-4E19-B200-9FFE58F04E4D}" type="datetimeFigureOut">
               <a:rPr lang="de-DE" smtClean="0"/>
-              <a:t>23.10.2020</a:t>
+              <a:t>24.06.2021</a:t>
             </a:fld>
             <a:endParaRPr lang="de-DE"/>
           </a:p>
@@ -2565,7 +2566,7 @@
           <a:p>
             <a:fld id="{BD94D9DB-14C8-4E19-B200-9FFE58F04E4D}" type="datetimeFigureOut">
               <a:rPr lang="de-DE" smtClean="0"/>
-              <a:t>23.10.2020</a:t>
+              <a:t>24.06.2021</a:t>
             </a:fld>
             <a:endParaRPr lang="de-DE"/>
           </a:p>
@@ -2977,7 +2978,7 @@
             <a:spLocks noGrp="1"/>
           </p:cNvSpPr>
           <p:nvPr>
-            <p:ph type="ctrTitle"/>
+            <p:ph type="title"/>
           </p:nvPr>
         </p:nvSpPr>
         <p:spPr/>
@@ -2985,50 +2986,435 @@
           <a:bodyPr/>
           <a:lstStyle/>
           <a:p>
-            <a:endParaRPr lang="de-DE"/>
-          </a:p>
-        </p:txBody>
-      </p:sp>
-      <p:sp>
-        <p:nvSpPr>
-          <p:cNvPr id="3" name="Untertitel 2"/>
-          <p:cNvSpPr>
-            <a:spLocks noGrp="1"/>
-          </p:cNvSpPr>
-          <p:nvPr>
-            <p:ph type="subTitle" idx="1"/>
-          </p:nvPr>
-        </p:nvSpPr>
-        <p:spPr/>
-        <p:txBody>
-          <a:bodyPr/>
-          <a:lstStyle/>
-          <a:p>
-            <a:endParaRPr lang="de-DE"/>
-          </a:p>
-        </p:txBody>
-      </p:sp>
+            <a:r>
+              <a:rPr lang="de-DE" dirty="0" smtClean="0"/>
+              <a:t>Dummy </a:t>
+            </a:r>
+            <a:r>
+              <a:rPr lang="de-DE" dirty="0" err="1" smtClean="0"/>
+              <a:t>solutions</a:t>
+            </a:r>
+            <a:endParaRPr lang="de-DE" dirty="0"/>
+          </a:p>
+        </p:txBody>
+      </p:sp>
+      <p:graphicFrame>
+        <p:nvGraphicFramePr>
+          <p:cNvPr id="5" name="Inhaltsplatzhalter 3"/>
+          <p:cNvGraphicFramePr>
+            <a:graphicFrameLocks noGrp="1"/>
+          </p:cNvGraphicFramePr>
+          <p:nvPr>
+            <p:ph idx="1"/>
+            <p:extLst>
+              <p:ext uri="{D42A27DB-BD31-4B8C-83A1-F6EECF244321}">
+                <p14:modId xmlns:p14="http://schemas.microsoft.com/office/powerpoint/2010/main" val="2411877235"/>
+              </p:ext>
+            </p:extLst>
+          </p:nvPr>
+        </p:nvGraphicFramePr>
+        <p:xfrm>
+          <a:off x="838200" y="1825625"/>
+          <a:ext cx="3777096" cy="2246052"/>
+        </p:xfrm>
+        <a:graphic>
+          <a:graphicData uri="http://schemas.openxmlformats.org/drawingml/2006/table">
+            <a:tbl>
+              <a:tblPr firstRow="1" bandRow="1">
+                <a:tableStyleId>{5C22544A-7EE6-4342-B048-85BDC9FD1C3A}</a:tableStyleId>
+              </a:tblPr>
+              <a:tblGrid>
+                <a:gridCol w="1259032">
+                  <a:extLst>
+                    <a:ext uri="{9D8B030D-6E8A-4147-A177-3AD203B41FA5}">
+                      <a16:colId xmlns:a16="http://schemas.microsoft.com/office/drawing/2014/main" val="3144362514"/>
+                    </a:ext>
+                  </a:extLst>
+                </a:gridCol>
+                <a:gridCol w="1259032">
+                  <a:extLst>
+                    <a:ext uri="{9D8B030D-6E8A-4147-A177-3AD203B41FA5}">
+                      <a16:colId xmlns:a16="http://schemas.microsoft.com/office/drawing/2014/main" val="253689244"/>
+                    </a:ext>
+                  </a:extLst>
+                </a:gridCol>
+                <a:gridCol w="1259032">
+                  <a:extLst>
+                    <a:ext uri="{9D8B030D-6E8A-4147-A177-3AD203B41FA5}">
+                      <a16:colId xmlns:a16="http://schemas.microsoft.com/office/drawing/2014/main" val="3998084255"/>
+                    </a:ext>
+                  </a:extLst>
+                </a:gridCol>
+              </a:tblGrid>
+              <a:tr h="401493">
+                <a:tc>
+                  <a:txBody>
+                    <a:bodyPr/>
+                    <a:lstStyle/>
+                    <a:p>
+                      <a:pPr algn="ctr"/>
+                      <a:r>
+                        <a:rPr lang="de-DE" dirty="0" smtClean="0"/>
+                        <a:t>Control Value</a:t>
+                      </a:r>
+                      <a:endParaRPr lang="de-DE" dirty="0"/>
+                    </a:p>
+                  </a:txBody>
+                  <a:tcPr/>
+                </a:tc>
+                <a:tc>
+                  <a:txBody>
+                    <a:bodyPr/>
+                    <a:lstStyle/>
+                    <a:p>
+                      <a:pPr algn="ctr"/>
+                      <a:r>
+                        <a:rPr lang="de-DE" dirty="0" smtClean="0"/>
+                        <a:t>x</a:t>
+                      </a:r>
+                      <a:endParaRPr lang="de-DE" dirty="0"/>
+                    </a:p>
+                  </a:txBody>
+                  <a:tcPr/>
+                </a:tc>
+                <a:tc>
+                  <a:txBody>
+                    <a:bodyPr/>
+                    <a:lstStyle/>
+                    <a:p>
+                      <a:pPr algn="ctr"/>
+                      <a:r>
+                        <a:rPr lang="de-DE" dirty="0" smtClean="0"/>
+                        <a:t>y</a:t>
+                      </a:r>
+                      <a:endParaRPr lang="de-DE" dirty="0"/>
+                    </a:p>
+                  </a:txBody>
+                  <a:tcPr/>
+                </a:tc>
+                <a:extLst>
+                  <a:ext uri="{0D108BD9-81ED-4DB2-BD59-A6C34878D82A}">
+                    <a16:rowId xmlns:a16="http://schemas.microsoft.com/office/drawing/2014/main" val="1822903133"/>
+                  </a:ext>
+                </a:extLst>
+              </a:tr>
+              <a:tr h="401493">
+                <a:tc>
+                  <a:txBody>
+                    <a:bodyPr/>
+                    <a:lstStyle/>
+                    <a:p>
+                      <a:pPr algn="ctr"/>
+                      <a:r>
+                        <a:rPr lang="de-DE" b="1" dirty="0" smtClean="0"/>
+                        <a:t>1</a:t>
+                      </a:r>
+                      <a:endParaRPr lang="de-DE" b="1" dirty="0"/>
+                    </a:p>
+                  </a:txBody>
+                  <a:tcPr/>
+                </a:tc>
+                <a:tc>
+                  <a:txBody>
+                    <a:bodyPr/>
+                    <a:lstStyle/>
+                    <a:p>
+                      <a:pPr algn="ctr"/>
+                      <a:r>
+                        <a:rPr lang="de-DE" dirty="0" smtClean="0"/>
+                        <a:t>1</a:t>
+                      </a:r>
+                      <a:endParaRPr lang="de-DE" dirty="0"/>
+                    </a:p>
+                  </a:txBody>
+                  <a:tcPr/>
+                </a:tc>
+                <a:tc>
+                  <a:txBody>
+                    <a:bodyPr/>
+                    <a:lstStyle/>
+                    <a:p>
+                      <a:pPr algn="ctr"/>
+                      <a:r>
+                        <a:rPr lang="de-DE" dirty="0" smtClean="0"/>
+                        <a:t>3</a:t>
+                      </a:r>
+                      <a:endParaRPr lang="de-DE" dirty="0"/>
+                    </a:p>
+                  </a:txBody>
+                  <a:tcPr/>
+                </a:tc>
+                <a:extLst>
+                  <a:ext uri="{0D108BD9-81ED-4DB2-BD59-A6C34878D82A}">
+                    <a16:rowId xmlns:a16="http://schemas.microsoft.com/office/drawing/2014/main" val="303026921"/>
+                  </a:ext>
+                </a:extLst>
+              </a:tr>
+              <a:tr h="401493">
+                <a:tc>
+                  <a:txBody>
+                    <a:bodyPr/>
+                    <a:lstStyle/>
+                    <a:p>
+                      <a:pPr algn="ctr"/>
+                      <a:r>
+                        <a:rPr lang="de-DE" b="1" dirty="0" smtClean="0"/>
+                        <a:t>2</a:t>
+                      </a:r>
+                      <a:endParaRPr lang="de-DE" b="1" dirty="0"/>
+                    </a:p>
+                  </a:txBody>
+                  <a:tcPr/>
+                </a:tc>
+                <a:tc>
+                  <a:txBody>
+                    <a:bodyPr/>
+                    <a:lstStyle/>
+                    <a:p>
+                      <a:pPr algn="ctr"/>
+                      <a:r>
+                        <a:rPr lang="de-DE" dirty="0" smtClean="0"/>
+                        <a:t>2</a:t>
+                      </a:r>
+                      <a:endParaRPr lang="de-DE" dirty="0"/>
+                    </a:p>
+                  </a:txBody>
+                  <a:tcPr/>
+                </a:tc>
+                <a:tc>
+                  <a:txBody>
+                    <a:bodyPr/>
+                    <a:lstStyle/>
+                    <a:p>
+                      <a:pPr algn="ctr"/>
+                      <a:r>
+                        <a:rPr lang="de-DE" dirty="0" smtClean="0"/>
+                        <a:t>2</a:t>
+                      </a:r>
+                      <a:endParaRPr lang="de-DE" dirty="0"/>
+                    </a:p>
+                  </a:txBody>
+                  <a:tcPr/>
+                </a:tc>
+                <a:extLst>
+                  <a:ext uri="{0D108BD9-81ED-4DB2-BD59-A6C34878D82A}">
+                    <a16:rowId xmlns:a16="http://schemas.microsoft.com/office/drawing/2014/main" val="1416331777"/>
+                  </a:ext>
+                </a:extLst>
+              </a:tr>
+              <a:tr h="401493">
+                <a:tc>
+                  <a:txBody>
+                    <a:bodyPr/>
+                    <a:lstStyle/>
+                    <a:p>
+                      <a:pPr algn="ctr"/>
+                      <a:r>
+                        <a:rPr lang="de-DE" b="1" dirty="0" smtClean="0"/>
+                        <a:t>3</a:t>
+                      </a:r>
+                      <a:endParaRPr lang="de-DE" b="1" dirty="0"/>
+                    </a:p>
+                  </a:txBody>
+                  <a:tcPr/>
+                </a:tc>
+                <a:tc>
+                  <a:txBody>
+                    <a:bodyPr/>
+                    <a:lstStyle/>
+                    <a:p>
+                      <a:pPr algn="ctr"/>
+                      <a:r>
+                        <a:rPr lang="de-DE" dirty="0" smtClean="0"/>
+                        <a:t>1</a:t>
+                      </a:r>
+                      <a:endParaRPr lang="de-DE" dirty="0"/>
+                    </a:p>
+                  </a:txBody>
+                  <a:tcPr/>
+                </a:tc>
+                <a:tc>
+                  <a:txBody>
+                    <a:bodyPr/>
+                    <a:lstStyle/>
+                    <a:p>
+                      <a:pPr algn="ctr"/>
+                      <a:r>
+                        <a:rPr lang="de-DE" dirty="0" smtClean="0"/>
+                        <a:t>2</a:t>
+                      </a:r>
+                      <a:endParaRPr lang="de-DE" dirty="0"/>
+                    </a:p>
+                  </a:txBody>
+                  <a:tcPr/>
+                </a:tc>
+                <a:extLst>
+                  <a:ext uri="{0D108BD9-81ED-4DB2-BD59-A6C34878D82A}">
+                    <a16:rowId xmlns:a16="http://schemas.microsoft.com/office/drawing/2014/main" val="2157968175"/>
+                  </a:ext>
+                </a:extLst>
+              </a:tr>
+              <a:tr h="401493">
+                <a:tc>
+                  <a:txBody>
+                    <a:bodyPr/>
+                    <a:lstStyle/>
+                    <a:p>
+                      <a:pPr algn="ctr"/>
+                      <a:r>
+                        <a:rPr lang="de-DE" b="1" dirty="0" smtClean="0"/>
+                        <a:t>4</a:t>
+                      </a:r>
+                      <a:endParaRPr lang="de-DE" b="1" dirty="0"/>
+                    </a:p>
+                  </a:txBody>
+                  <a:tcPr/>
+                </a:tc>
+                <a:tc>
+                  <a:txBody>
+                    <a:bodyPr/>
+                    <a:lstStyle/>
+                    <a:p>
+                      <a:pPr algn="ctr"/>
+                      <a:r>
+                        <a:rPr lang="de-DE" dirty="0" smtClean="0"/>
+                        <a:t>3</a:t>
+                      </a:r>
+                      <a:endParaRPr lang="de-DE" dirty="0"/>
+                    </a:p>
+                  </a:txBody>
+                  <a:tcPr/>
+                </a:tc>
+                <a:tc>
+                  <a:txBody>
+                    <a:bodyPr/>
+                    <a:lstStyle/>
+                    <a:p>
+                      <a:pPr algn="ctr"/>
+                      <a:r>
+                        <a:rPr lang="de-DE" dirty="0" smtClean="0"/>
+                        <a:t>1</a:t>
+                      </a:r>
+                      <a:endParaRPr lang="de-DE" dirty="0"/>
+                    </a:p>
+                  </a:txBody>
+                  <a:tcPr/>
+                </a:tc>
+                <a:extLst>
+                  <a:ext uri="{0D108BD9-81ED-4DB2-BD59-A6C34878D82A}">
+                    <a16:rowId xmlns:a16="http://schemas.microsoft.com/office/drawing/2014/main" val="1224767987"/>
+                  </a:ext>
+                </a:extLst>
+              </a:tr>
+            </a:tbl>
+          </a:graphicData>
+        </a:graphic>
+      </p:graphicFrame>
     </p:spTree>
     <p:extLst>
       <p:ext uri="{BB962C8B-B14F-4D97-AF65-F5344CB8AC3E}">
-        <p14:creationId xmlns:p14="http://schemas.microsoft.com/office/powerpoint/2010/main" val="2015753699"/>
+        <p14:creationId xmlns:p14="http://schemas.microsoft.com/office/powerpoint/2010/main" val="4025415021"/>
       </p:ext>
     </p:extLst>
   </p:cSld>
   <p:clrMapOvr>
     <a:masterClrMapping/>
   </p:clrMapOvr>
-  <p:timing>
-    <p:tnLst>
-      <p:par>
-        <p:cTn id="1" dur="indefinite" restart="never" nodeType="tmRoot"/>
-      </p:par>
-    </p:tnLst>
-  </p:timing>
 </p:sld>
 </file>
 
 <file path=ppt/slides/slide2.xml><?xml version="1.0" encoding="utf-8"?>
+<p:sld xmlns:a="http://schemas.openxmlformats.org/drawingml/2006/main" xmlns:r="http://schemas.openxmlformats.org/officeDocument/2006/relationships" xmlns:p="http://schemas.openxmlformats.org/presentationml/2006/main">
+  <p:cSld>
+    <p:spTree>
+      <p:nvGrpSpPr>
+        <p:cNvPr id="1" name=""/>
+        <p:cNvGrpSpPr/>
+        <p:nvPr/>
+      </p:nvGrpSpPr>
+      <p:grpSpPr>
+        <a:xfrm>
+          <a:off x="0" y="0"/>
+          <a:ext cx="0" cy="0"/>
+          <a:chOff x="0" y="0"/>
+          <a:chExt cx="0" cy="0"/>
+        </a:xfrm>
+      </p:grpSpPr>
+      <p:sp>
+        <p:nvSpPr>
+          <p:cNvPr id="2" name="Titel 1"/>
+          <p:cNvSpPr>
+            <a:spLocks noGrp="1"/>
+          </p:cNvSpPr>
+          <p:nvPr>
+            <p:ph type="title"/>
+          </p:nvPr>
+        </p:nvSpPr>
+        <p:spPr/>
+        <p:txBody>
+          <a:bodyPr/>
+          <a:lstStyle/>
+          <a:p>
+            <a:r>
+              <a:rPr lang="de-DE" dirty="0" err="1" smtClean="0"/>
+              <a:t>Example</a:t>
+            </a:r>
+            <a:r>
+              <a:rPr lang="de-DE" dirty="0" smtClean="0"/>
+              <a:t> Problem </a:t>
+            </a:r>
+            <a:r>
+              <a:rPr lang="de-DE" dirty="0" err="1" smtClean="0"/>
+              <a:t>from</a:t>
+            </a:r>
+            <a:r>
+              <a:rPr lang="de-DE" dirty="0" smtClean="0"/>
+              <a:t> Wallis 2014</a:t>
+            </a:r>
+            <a:endParaRPr lang="de-DE" dirty="0"/>
+          </a:p>
+        </p:txBody>
+      </p:sp>
+      <p:pic>
+        <p:nvPicPr>
+          <p:cNvPr id="4" name="Inhaltsplatzhalter 3"/>
+          <p:cNvPicPr>
+            <a:picLocks noGrp="1" noChangeAspect="1"/>
+          </p:cNvPicPr>
+          <p:nvPr>
+            <p:ph idx="1"/>
+          </p:nvPr>
+        </p:nvPicPr>
+        <p:blipFill>
+          <a:blip r:embed="rId2"/>
+          <a:stretch>
+            <a:fillRect/>
+          </a:stretch>
+        </p:blipFill>
+        <p:spPr>
+          <a:xfrm>
+            <a:off x="838200" y="2286241"/>
+            <a:ext cx="10515600" cy="3430105"/>
+          </a:xfrm>
+          <a:prstGeom prst="rect">
+            <a:avLst/>
+          </a:prstGeom>
+        </p:spPr>
+      </p:pic>
+    </p:spTree>
+    <p:extLst>
+      <p:ext uri="{BB962C8B-B14F-4D97-AF65-F5344CB8AC3E}">
+        <p14:creationId xmlns:p14="http://schemas.microsoft.com/office/powerpoint/2010/main" val="214355675"/>
+      </p:ext>
+    </p:extLst>
+  </p:cSld>
+  <p:clrMapOvr>
+    <a:masterClrMapping/>
+  </p:clrMapOvr>
+</p:sld>
+</file>
+
+<file path=ppt/slides/slide3.xml><?xml version="1.0" encoding="utf-8"?>
 <p:sld xmlns:a="http://schemas.openxmlformats.org/drawingml/2006/main" xmlns:r="http://schemas.openxmlformats.org/officeDocument/2006/relationships" xmlns:p="http://schemas.openxmlformats.org/presentationml/2006/main">
   <p:cSld>
     <p:spTree>

</xml_diff>

<commit_message>
Update on data and documentation
</commit_message>
<xml_diff>
--- a/algorithms/voting_mechanisms/play_data.pptx
+++ b/algorithms/voting_mechanisms/play_data.pptx
@@ -3008,7 +3008,7 @@
             <p:ph idx="1"/>
             <p:extLst>
               <p:ext uri="{D42A27DB-BD31-4B8C-83A1-F6EECF244321}">
-                <p14:modId xmlns:p14="http://schemas.microsoft.com/office/powerpoint/2010/main" val="2411877235"/>
+                <p14:modId xmlns:p14="http://schemas.microsoft.com/office/powerpoint/2010/main" val="3655868058"/>
               </p:ext>
             </p:extLst>
           </p:nvPr>
@@ -3107,7 +3107,7 @@
                       <a:pPr algn="ctr"/>
                       <a:r>
                         <a:rPr lang="de-DE" b="1" dirty="0" smtClean="0"/>
-                        <a:t>1</a:t>
+                        <a:t>A</a:t>
                       </a:r>
                       <a:endParaRPr lang="de-DE" b="1" dirty="0"/>
                     </a:p>
@@ -3159,7 +3159,7 @@
                       <a:pPr algn="ctr"/>
                       <a:r>
                         <a:rPr lang="de-DE" b="1" dirty="0" smtClean="0"/>
-                        <a:t>2</a:t>
+                        <a:t>B</a:t>
                       </a:r>
                       <a:endParaRPr lang="de-DE" b="1" dirty="0"/>
                     </a:p>
@@ -3211,7 +3211,7 @@
                       <a:pPr algn="ctr"/>
                       <a:r>
                         <a:rPr lang="de-DE" b="1" dirty="0" smtClean="0"/>
-                        <a:t>3</a:t>
+                        <a:t>C</a:t>
                       </a:r>
                       <a:endParaRPr lang="de-DE" b="1" dirty="0"/>
                     </a:p>
@@ -3263,7 +3263,7 @@
                       <a:pPr algn="ctr"/>
                       <a:r>
                         <a:rPr lang="de-DE" b="1" dirty="0" smtClean="0"/>
-                        <a:t>4</a:t>
+                        <a:t>D</a:t>
                       </a:r>
                       <a:endParaRPr lang="de-DE" b="1" dirty="0"/>
                     </a:p>

</xml_diff>